<commit_message>
Oral discussion - PowerPoint personal Notes
</commit_message>
<xml_diff>
--- a/Oral Discussion/Software Engineering.pptx
+++ b/Oral Discussion/Software Engineering.pptx
@@ -125,6 +125,9 @@
     <p:ext uri="{EFAFB233-063F-42B5-8137-9DF3F51BA10A}">
       <p15:sldGuideLst xmlns:p15="http://schemas.microsoft.com/office/powerpoint/2012/main"/>
     </p:ext>
+    <p:ext uri="{2D200454-40CA-4A62-9FC3-DE9A4176ACB9}">
+      <p15:notesGuideLst xmlns:p15="http://schemas.microsoft.com/office/powerpoint/2012/main"/>
+    </p:ext>
   </p:extLst>
 </p:presentation>
 </file>
@@ -539,6 +542,18 @@
               <a:t>Rémi</a:t>
             </a:r>
           </a:p>
+          <a:p>
+            <a:r>
+              <a:rPr lang="fr-FR" dirty="0"/>
+              <a:t>Car sharing service</a:t>
+            </a:r>
+          </a:p>
+          <a:p>
+            <a:r>
+              <a:rPr lang="fr-FR" dirty="0"/>
+              <a:t>Electric Car</a:t>
+            </a:r>
+          </a:p>
         </p:txBody>
       </p:sp>
       <p:sp>
@@ -1434,6 +1449,81 @@
               <a:t>Rémi</a:t>
             </a:r>
           </a:p>
+          <a:p>
+            <a:r>
+              <a:rPr lang="fr-FR" dirty="0"/>
+              <a:t>Scenario </a:t>
+            </a:r>
+            <a:r>
+              <a:rPr lang="fr-FR" dirty="0" err="1"/>
+              <a:t>involving</a:t>
+            </a:r>
+            <a:r>
+              <a:rPr lang="fr-FR" dirty="0"/>
+              <a:t> the </a:t>
+            </a:r>
+            <a:r>
+              <a:rPr lang="fr-FR" dirty="0" err="1"/>
+              <a:t>previously</a:t>
+            </a:r>
+            <a:r>
+              <a:rPr lang="fr-FR" dirty="0"/>
+              <a:t> </a:t>
+            </a:r>
+            <a:r>
+              <a:rPr lang="fr-FR" dirty="0" err="1"/>
+              <a:t>explained</a:t>
+            </a:r>
+            <a:r>
+              <a:rPr lang="fr-FR" dirty="0"/>
+              <a:t> </a:t>
+            </a:r>
+            <a:r>
+              <a:rPr lang="fr-FR" dirty="0" err="1"/>
+              <a:t>requirements</a:t>
+            </a:r>
+            <a:endParaRPr lang="fr-FR" dirty="0"/>
+          </a:p>
+          <a:p>
+            <a:endParaRPr lang="fr-FR" dirty="0"/>
+          </a:p>
+          <a:p>
+            <a:r>
+              <a:rPr lang="fr-FR" dirty="0" err="1"/>
+              <a:t>Specifications</a:t>
+            </a:r>
+            <a:r>
+              <a:rPr lang="fr-FR" dirty="0"/>
+              <a:t> =&gt; </a:t>
+            </a:r>
+            <a:r>
+              <a:rPr lang="fr-FR" dirty="0" err="1"/>
+              <a:t>Implementation</a:t>
+            </a:r>
+            <a:endParaRPr lang="fr-FR" dirty="0"/>
+          </a:p>
+          <a:p>
+            <a:r>
+              <a:rPr lang="fr-FR" dirty="0"/>
+              <a:t>High </a:t>
+            </a:r>
+            <a:r>
+              <a:rPr lang="fr-FR" dirty="0" err="1"/>
+              <a:t>Level</a:t>
+            </a:r>
+            <a:endParaRPr lang="fr-FR" dirty="0"/>
+          </a:p>
+          <a:p>
+            <a:r>
+              <a:rPr lang="fr-FR" dirty="0"/>
+              <a:t>DB </a:t>
+            </a:r>
+            <a:r>
+              <a:rPr lang="fr-FR" dirty="0" err="1"/>
+              <a:t>models</a:t>
+            </a:r>
+            <a:endParaRPr lang="fr-FR" dirty="0"/>
+          </a:p>
         </p:txBody>
       </p:sp>
       <p:sp>
@@ -1521,6 +1611,90 @@
               <a:t>Rémi</a:t>
             </a:r>
           </a:p>
+          <a:p>
+            <a:r>
+              <a:rPr lang="fr-FR" dirty="0" err="1"/>
+              <a:t>Models</a:t>
+            </a:r>
+            <a:r>
+              <a:rPr lang="fr-FR" dirty="0"/>
+              <a:t> -&gt; </a:t>
+            </a:r>
+            <a:r>
+              <a:rPr lang="fr-FR" dirty="0" err="1"/>
+              <a:t>Controllers</a:t>
+            </a:r>
+            <a:endParaRPr lang="fr-FR" dirty="0"/>
+          </a:p>
+          <a:p>
+            <a:r>
+              <a:rPr lang="fr-FR" dirty="0"/>
+              <a:t>Driver</a:t>
+            </a:r>
+          </a:p>
+          <a:p>
+            <a:r>
+              <a:rPr lang="fr-FR" dirty="0"/>
+              <a:t>Notifications</a:t>
+            </a:r>
+          </a:p>
+          <a:p>
+            <a:pPr marL="0" marR="0" lvl="0" indent="0" algn="l" defTabSz="914400" rtl="0" eaLnBrk="1" fontAlgn="auto" latinLnBrk="0" hangingPunct="1">
+              <a:lnSpc>
+                <a:spcPct val="100000"/>
+              </a:lnSpc>
+              <a:spcBef>
+                <a:spcPts val="0"/>
+              </a:spcBef>
+              <a:spcAft>
+                <a:spcPts val="0"/>
+              </a:spcAft>
+              <a:buClrTx/>
+              <a:buSzTx/>
+              <a:buFontTx/>
+              <a:buNone/>
+              <a:tabLst/>
+              <a:defRPr/>
+            </a:pPr>
+            <a:r>
+              <a:rPr lang="fr-FR" dirty="0"/>
+              <a:t>-&gt; Use of </a:t>
+            </a:r>
+            <a:r>
+              <a:rPr lang="fr-FR" dirty="0" err="1"/>
+              <a:t>third</a:t>
+            </a:r>
+            <a:r>
+              <a:rPr lang="fr-FR" dirty="0"/>
+              <a:t> party components</a:t>
+            </a:r>
+            <a:endParaRPr lang="fr-FR" dirty="0"/>
+          </a:p>
+          <a:p>
+            <a:endParaRPr lang="fr-FR" dirty="0"/>
+          </a:p>
+          <a:p>
+            <a:r>
+              <a:rPr lang="fr-FR" dirty="0"/>
+              <a:t>-&gt; </a:t>
+            </a:r>
+            <a:r>
+              <a:rPr lang="fr-FR" dirty="0" err="1"/>
+              <a:t>Dependencies</a:t>
+            </a:r>
+            <a:endParaRPr lang="fr-FR" dirty="0"/>
+          </a:p>
+          <a:p>
+            <a:r>
+              <a:rPr lang="fr-FR" dirty="0"/>
+              <a:t>-&gt; Lead to </a:t>
+            </a:r>
+            <a:r>
+              <a:rPr lang="fr-FR" dirty="0" err="1"/>
+              <a:t>integration</a:t>
+            </a:r>
+            <a:endParaRPr lang="fr-FR" dirty="0"/>
+          </a:p>
         </p:txBody>
       </p:sp>
       <p:sp>
@@ -1789,9 +1963,73 @@
           <a:lstStyle/>
           <a:p>
             <a:r>
-              <a:rPr lang="fr-FR" dirty="0"/>
+              <a:rPr lang="en-US" noProof="0" dirty="0"/>
               <a:t>Rémi</a:t>
             </a:r>
+          </a:p>
+          <a:p>
+            <a:r>
+              <a:rPr lang="en-US" noProof="0" dirty="0"/>
+              <a:t>Bottom up approach</a:t>
+            </a:r>
+          </a:p>
+          <a:p>
+            <a:r>
+              <a:rPr lang="en-US" noProof="0" dirty="0"/>
+              <a:t>-&gt; speed up the development</a:t>
+            </a:r>
+          </a:p>
+          <a:p>
+            <a:r>
+              <a:rPr lang="en-US" noProof="0" dirty="0"/>
+              <a:t>-&gt; early tests</a:t>
+            </a:r>
+          </a:p>
+          <a:p>
+            <a:endParaRPr lang="en-US" noProof="0" dirty="0"/>
+          </a:p>
+          <a:p>
+            <a:r>
+              <a:rPr lang="en-US" noProof="0" dirty="0"/>
+              <a:t>Arrow -&gt; Integration order</a:t>
+            </a:r>
+          </a:p>
+          <a:p>
+            <a:r>
+              <a:rPr lang="en-US" noProof="0" dirty="0"/>
+              <a:t>Integration</a:t>
+            </a:r>
+          </a:p>
+          <a:p>
+            <a:pPr marL="171450" indent="-171450">
+              <a:buFontTx/>
+              <a:buChar char="-"/>
+            </a:pPr>
+            <a:r>
+              <a:rPr lang="en-US" noProof="0" dirty="0"/>
+              <a:t>DBMS</a:t>
+            </a:r>
+          </a:p>
+          <a:p>
+            <a:pPr marL="171450" indent="-171450">
+              <a:buFontTx/>
+              <a:buChar char="-"/>
+            </a:pPr>
+            <a:r>
+              <a:rPr lang="en-US" noProof="0" dirty="0"/>
+              <a:t>Third Party</a:t>
+            </a:r>
+          </a:p>
+          <a:p>
+            <a:pPr marL="171450" indent="-171450">
+              <a:buFontTx/>
+              <a:buChar char="-"/>
+            </a:pPr>
+            <a:r>
+              <a:rPr lang="en-US" noProof="0"/>
+              <a:t>Rest</a:t>
+            </a:r>
+            <a:endParaRPr lang="en-US" noProof="0" dirty="0"/>
           </a:p>
         </p:txBody>
       </p:sp>

</xml_diff>